<commit_message>
added db schema to ppt
</commit_message>
<xml_diff>
--- a/presentation/MSDS7330 Project draft.pptx
+++ b/presentation/MSDS7330 Project draft.pptx
@@ -217,7 +217,7 @@
           <a:p>
             <a:fld id="{935336F5-A68D-9A4A-83AB-B8CD6FA5C732}" type="datetimeFigureOut">
               <a:rPr lang="en-US" smtClean="0"/>
-              <a:t>2/21/2019</a:t>
+              <a:t>2/24/2019</a:t>
             </a:fld>
             <a:endParaRPr lang="en-US"/>
           </a:p>
@@ -866,7 +866,7 @@
           <a:p>
             <a:fld id="{D8AC05B1-2526-7C44-8A74-66C916069F4A}" type="datetime1">
               <a:rPr lang="en-US" smtClean="0"/>
-              <a:t>2/21/2019</a:t>
+              <a:t>2/24/2019</a:t>
             </a:fld>
             <a:endParaRPr lang="en-US"/>
           </a:p>
@@ -1057,7 +1057,7 @@
           <a:p>
             <a:fld id="{C0E5C021-D243-504D-84B8-D45D829E8B6B}" type="datetime1">
               <a:rPr lang="en-US" smtClean="0"/>
-              <a:t>2/21/2019</a:t>
+              <a:t>2/24/2019</a:t>
             </a:fld>
             <a:endParaRPr lang="en-US"/>
           </a:p>
@@ -1238,7 +1238,7 @@
           <a:p>
             <a:fld id="{B6F93F85-28A1-8344-9763-EF19E19F9128}" type="datetime1">
               <a:rPr lang="en-US" smtClean="0"/>
-              <a:t>2/21/2019</a:t>
+              <a:t>2/24/2019</a:t>
             </a:fld>
             <a:endParaRPr lang="en-US"/>
           </a:p>
@@ -1502,7 +1502,7 @@
           <a:p>
             <a:fld id="{A2B5E9FB-9AD4-754B-A772-6D3733DD5BAC}" type="datetime1">
               <a:rPr lang="en-US" smtClean="0"/>
-              <a:t>2/21/2019</a:t>
+              <a:t>2/24/2019</a:t>
             </a:fld>
             <a:endParaRPr lang="en-US"/>
           </a:p>
@@ -1745,7 +1745,7 @@
           <a:p>
             <a:fld id="{3140DF9E-9222-EE48-A64D-28DE5FAE4784}" type="datetime1">
               <a:rPr lang="en-US" smtClean="0"/>
-              <a:t>2/21/2019</a:t>
+              <a:t>2/24/2019</a:t>
             </a:fld>
             <a:endParaRPr lang="en-US"/>
           </a:p>
@@ -2123,7 +2123,7 @@
           <a:p>
             <a:fld id="{A61490FA-57A5-0041-9FDC-ACD83A9AA0E7}" type="datetime1">
               <a:rPr lang="en-US" smtClean="0"/>
-              <a:t>2/21/2019</a:t>
+              <a:t>2/24/2019</a:t>
             </a:fld>
             <a:endParaRPr lang="en-US"/>
           </a:p>
@@ -2252,7 +2252,7 @@
           <a:p>
             <a:fld id="{7E8290BC-2F66-E549-BF33-0BE20A5801B5}" type="datetime1">
               <a:rPr lang="en-US" smtClean="0"/>
-              <a:t>2/21/2019</a:t>
+              <a:t>2/24/2019</a:t>
             </a:fld>
             <a:endParaRPr lang="en-US"/>
           </a:p>
@@ -2358,7 +2358,7 @@
           <a:p>
             <a:fld id="{3BC728CC-7587-8545-9431-C9A8BB34EC62}" type="datetime1">
               <a:rPr lang="en-US" smtClean="0"/>
-              <a:t>2/21/2019</a:t>
+              <a:t>2/24/2019</a:t>
             </a:fld>
             <a:endParaRPr lang="en-US"/>
           </a:p>
@@ -2646,7 +2646,7 @@
           <a:p>
             <a:fld id="{9A66CD15-5422-0542-9CE8-BC312846333A}" type="datetime1">
               <a:rPr lang="en-US" smtClean="0"/>
-              <a:t>2/21/2019</a:t>
+              <a:t>2/24/2019</a:t>
             </a:fld>
             <a:endParaRPr lang="en-US"/>
           </a:p>
@@ -2914,7 +2914,7 @@
           <a:p>
             <a:fld id="{2A2384D1-AE54-4D4A-B83F-6EAD03BEB987}" type="datetime1">
               <a:rPr lang="en-US" smtClean="0"/>
-              <a:t>2/21/2019</a:t>
+              <a:t>2/24/2019</a:t>
             </a:fld>
             <a:endParaRPr lang="en-US"/>
           </a:p>
@@ -6142,25 +6142,6 @@
       </p:sp>
       <p:sp>
         <p:nvSpPr>
-          <p:cNvPr id="3" name="Content Placeholder 2"/>
-          <p:cNvSpPr>
-            <a:spLocks noGrp="1"/>
-          </p:cNvSpPr>
-          <p:nvPr>
-            <p:ph idx="1"/>
-          </p:nvPr>
-        </p:nvSpPr>
-        <p:spPr/>
-        <p:txBody>
-          <a:bodyPr/>
-          <a:lstStyle/>
-          <a:p>
-            <a:endParaRPr lang="en-US"/>
-          </a:p>
-        </p:txBody>
-      </p:sp>
-      <p:sp>
-        <p:nvSpPr>
           <p:cNvPr id="4" name="Slide Number Placeholder 3"/>
           <p:cNvSpPr>
             <a:spLocks noGrp="1"/>
@@ -6182,6 +6163,36 @@
           </a:p>
         </p:txBody>
       </p:sp>
+      <p:pic>
+        <p:nvPicPr>
+          <p:cNvPr id="5" name="Picture 4">
+            <a:extLst>
+              <a:ext uri="{FF2B5EF4-FFF2-40B4-BE49-F238E27FC236}">
+                <a16:creationId xmlns:a16="http://schemas.microsoft.com/office/drawing/2014/main" id="{9BF5D707-46C6-4854-9CB6-E3D26BB2B248}"/>
+              </a:ext>
+            </a:extLst>
+          </p:cNvPr>
+          <p:cNvPicPr>
+            <a:picLocks noChangeAspect="1"/>
+          </p:cNvPicPr>
+          <p:nvPr/>
+        </p:nvPicPr>
+        <p:blipFill>
+          <a:blip r:embed="rId2"/>
+          <a:stretch>
+            <a:fillRect/>
+          </a:stretch>
+        </p:blipFill>
+        <p:spPr>
+          <a:xfrm>
+            <a:off x="750642" y="1600200"/>
+            <a:ext cx="7115175" cy="4343400"/>
+          </a:xfrm>
+          <a:prstGeom prst="rect">
+            <a:avLst/>
+          </a:prstGeom>
+        </p:spPr>
+      </p:pic>
     </p:spTree>
     <p:extLst>
       <p:ext uri="{BB962C8B-B14F-4D97-AF65-F5344CB8AC3E}">

</xml_diff>